<commit_message>
Adding slides for Day1
</commit_message>
<xml_diff>
--- a/lectures/day_1/WEP24_Day1_Basics.pptx
+++ b/lectures/day_1/WEP24_Day1_Basics.pptx
@@ -3336,7 +3336,7 @@
           <a:p>
             <a:fld id="{8F6C72E7-1AC8-4769-8510-C8FBA4EE0D31}" type="datetimeFigureOut">
               <a:rPr lang="nl-NL" smtClean="0"/>
-              <a:t>15-01-2023</a:t>
+              <a:t>15-12-2023</a:t>
             </a:fld>
             <a:endParaRPr lang="nl-NL"/>
           </a:p>
@@ -3623,17 +3623,17 @@
       </p:grpSpPr>
       <p:pic>
         <p:nvPicPr>
-          <p:cNvPr id="8" name="Picture 7" descr="A picture containing text, clipart, vector graphics&#10;&#10;Description automatically generated">
+          <p:cNvPr id="7" name="Picture 6" descr="Shape&#10;&#10;Description automatically generated">
             <a:extLst>
               <a:ext uri="{FF2B5EF4-FFF2-40B4-BE49-F238E27FC236}">
-                <a16:creationId xmlns:a16="http://schemas.microsoft.com/office/drawing/2014/main" id="{A8F37EF6-29B5-666F-C45B-95A766B08BA6}"/>
+                <a16:creationId xmlns:a16="http://schemas.microsoft.com/office/drawing/2014/main" id="{5382FA10-F82C-5BEE-5653-8BB06183A2B6}"/>
               </a:ext>
             </a:extLst>
           </p:cNvPr>
           <p:cNvPicPr>
             <a:picLocks noChangeAspect="1"/>
           </p:cNvPicPr>
-          <p:nvPr/>
+          <p:nvPr userDrawn="1"/>
         </p:nvPicPr>
         <p:blipFill>
           <a:blip r:embed="rId2">
@@ -3649,15 +3649,12 @@
         </p:blipFill>
         <p:spPr>
           <a:xfrm>
-            <a:off x="0" y="0"/>
-            <a:ext cx="12192000" cy="6858000"/>
+            <a:off x="0" y="-94129"/>
+            <a:ext cx="12359340" cy="6952129"/>
           </a:xfrm>
           <a:prstGeom prst="rect">
             <a:avLst/>
           </a:prstGeom>
-          <a:solidFill>
-            <a:srgbClr val="FE04AC"/>
-          </a:solidFill>
         </p:spPr>
       </p:pic>
       <p:pic>
@@ -3699,6 +3696,137 @@
           </a:ln>
         </p:spPr>
       </p:pic>
+      <p:sp>
+        <p:nvSpPr>
+          <p:cNvPr id="4" name="TextBox 3">
+            <a:extLst>
+              <a:ext uri="{FF2B5EF4-FFF2-40B4-BE49-F238E27FC236}">
+                <a16:creationId xmlns:a16="http://schemas.microsoft.com/office/drawing/2014/main" id="{8C799D20-08C5-ABFD-D93D-208C7ECC76B8}"/>
+              </a:ext>
+            </a:extLst>
+          </p:cNvPr>
+          <p:cNvSpPr txBox="1"/>
+          <p:nvPr userDrawn="1"/>
+        </p:nvSpPr>
+        <p:spPr>
+          <a:xfrm>
+            <a:off x="682831" y="1220786"/>
+            <a:ext cx="7736773" cy="1569660"/>
+          </a:xfrm>
+          <a:prstGeom prst="rect">
+            <a:avLst/>
+          </a:prstGeom>
+          <a:noFill/>
+        </p:spPr>
+        <p:txBody>
+          <a:bodyPr wrap="square">
+            <a:spAutoFit/>
+          </a:bodyPr>
+          <a:lstStyle/>
+          <a:p>
+            <a:r>
+              <a:rPr lang="en-US" sz="4800" dirty="0">
+                <a:latin typeface="Gill Sans Ultra Bold" panose="020B0A02020104020203" pitchFamily="34" charset="77"/>
+                <a:cs typeface="Phosphate Inline" panose="02000506050000020004" pitchFamily="2" charset="77"/>
+              </a:rPr>
+              <a:t>Digital </a:t>
+            </a:r>
+            <a:r>
+              <a:rPr lang="en-US" sz="4800" dirty="0">
+                <a:latin typeface="Gill Sans Ultra Bold" panose="020B0A02020104020203" pitchFamily="34" charset="77"/>
+                <a:cs typeface="Phosphate Inline" panose="02000506050000020004" pitchFamily="2" charset="77"/>
+              </a:rPr>
+              <a:t>Adventure </a:t>
+            </a:r>
+          </a:p>
+          <a:p>
+            <a:r>
+              <a:rPr lang="en-US" sz="4800" dirty="0">
+                <a:latin typeface="Gill Sans Ultra Bold" panose="020B0A02020104020203" pitchFamily="34" charset="77"/>
+                <a:cs typeface="Phosphate Inline" panose="02000506050000020004" pitchFamily="2" charset="77"/>
+              </a:rPr>
+              <a:t>Ride to the Future</a:t>
+            </a:r>
+          </a:p>
+        </p:txBody>
+      </p:sp>
+      <p:pic>
+        <p:nvPicPr>
+          <p:cNvPr id="6" name="Picture 5" descr="A colorful circle with dots&#10;&#10;Description automatically generated with medium confidence">
+            <a:extLst>
+              <a:ext uri="{FF2B5EF4-FFF2-40B4-BE49-F238E27FC236}">
+                <a16:creationId xmlns:a16="http://schemas.microsoft.com/office/drawing/2014/main" id="{D95237A8-FE1E-D4C4-812B-0584914592AA}"/>
+              </a:ext>
+            </a:extLst>
+          </p:cNvPr>
+          <p:cNvPicPr>
+            <a:picLocks noChangeAspect="1"/>
+          </p:cNvPicPr>
+          <p:nvPr userDrawn="1"/>
+        </p:nvPicPr>
+        <p:blipFill>
+          <a:blip r:embed="rId5">
+            <a:extLst>
+              <a:ext uri="{28A0092B-C50C-407E-A947-70E740481C1C}">
+                <a14:useLocalDpi xmlns:a14="http://schemas.microsoft.com/office/drawing/2010/main" val="0"/>
+              </a:ext>
+            </a:extLst>
+          </a:blip>
+          <a:stretch>
+            <a:fillRect/>
+          </a:stretch>
+        </p:blipFill>
+        <p:spPr>
+          <a:xfrm>
+            <a:off x="6871464" y="1828800"/>
+            <a:ext cx="5177641" cy="5177641"/>
+          </a:xfrm>
+          <a:prstGeom prst="rect">
+            <a:avLst/>
+          </a:prstGeom>
+        </p:spPr>
+      </p:pic>
+      <p:sp>
+        <p:nvSpPr>
+          <p:cNvPr id="9" name="TextBox 8">
+            <a:extLst>
+              <a:ext uri="{FF2B5EF4-FFF2-40B4-BE49-F238E27FC236}">
+                <a16:creationId xmlns:a16="http://schemas.microsoft.com/office/drawing/2014/main" id="{6BF71102-DF52-ACCC-19DD-3C4F2CB5044F}"/>
+              </a:ext>
+            </a:extLst>
+          </p:cNvPr>
+          <p:cNvSpPr txBox="1"/>
+          <p:nvPr userDrawn="1"/>
+        </p:nvSpPr>
+        <p:spPr>
+          <a:xfrm>
+            <a:off x="743597" y="3381935"/>
+            <a:ext cx="7736773" cy="830997"/>
+          </a:xfrm>
+          <a:prstGeom prst="rect">
+            <a:avLst/>
+          </a:prstGeom>
+          <a:noFill/>
+        </p:spPr>
+        <p:txBody>
+          <a:bodyPr wrap="square">
+            <a:spAutoFit/>
+          </a:bodyPr>
+          <a:lstStyle/>
+          <a:p>
+            <a:r>
+              <a:rPr lang="en-US" sz="4800" dirty="0">
+                <a:solidFill>
+                  <a:srgbClr val="990000"/>
+                </a:solidFill>
+                <a:latin typeface="Gill Sans Ultra Bold" panose="020B0A02020104020203" pitchFamily="34" charset="77"/>
+                <a:cs typeface="Phosphate Inline" panose="02000506050000020004" pitchFamily="2" charset="77"/>
+              </a:rPr>
+              <a:t>7 – 18 January</a:t>
+            </a:r>
+          </a:p>
+        </p:txBody>
+      </p:sp>
     </p:spTree>
     <p:extLst>
       <p:ext uri="{BB962C8B-B14F-4D97-AF65-F5344CB8AC3E}">
@@ -31245,7 +31373,7 @@
         <p:spPr>
           <a:xfrm>
             <a:off x="1133856" y="1597152"/>
-            <a:ext cx="9668256" cy="3625608"/>
+            <a:ext cx="9668256" cy="4142673"/>
           </a:xfrm>
           <a:prstGeom prst="rect">
             <a:avLst/>
@@ -31387,6 +31515,30 @@
                 <a:ea typeface="ＭＳ Ｐゴシック" panose="020B0600070205080204" pitchFamily="34" charset="-128"/>
               </a:rPr>
               <a:t>(Day 4)</a:t>
+            </a:r>
+          </a:p>
+          <a:p>
+            <a:pPr marL="457200" indent="-457200">
+              <a:lnSpc>
+                <a:spcPct val="120000"/>
+              </a:lnSpc>
+              <a:buFont typeface="Arial" panose="020B0604020202020204" pitchFamily="34" charset="0"/>
+              <a:buChar char="•"/>
+            </a:pPr>
+            <a:r>
+              <a:rPr lang="en-US" altLang="en-NL" sz="2800" dirty="0">
+                <a:ea typeface="ＭＳ Ｐゴシック" panose="020B0600070205080204" pitchFamily="34" charset="-128"/>
+              </a:rPr>
+              <a:t>Text Mining </a:t>
+            </a:r>
+            <a:r>
+              <a:rPr lang="en-US" altLang="en-NL" sz="2800" dirty="0">
+                <a:solidFill>
+                  <a:srgbClr val="990000"/>
+                </a:solidFill>
+                <a:ea typeface="ＭＳ Ｐゴシック" panose="020B0600070205080204" pitchFamily="34" charset="-128"/>
+              </a:rPr>
+              <a:t>(Day 5)</a:t>
             </a:r>
             <a:endParaRPr lang="en-US" altLang="en-NL" sz="2800" dirty="0">
               <a:ea typeface="ＭＳ Ｐゴシック" panose="020B0600070205080204" pitchFamily="34" charset="-128"/>
@@ -32000,15 +32152,6 @@
 </file>
 
 <file path=customXml/item1.xml><?xml version="1.0" encoding="utf-8"?>
-<?mso-contentType ?>
-<FormTemplates xmlns="http://schemas.microsoft.com/sharepoint/v3/contenttype/forms">
-  <Display>DocumentLibraryForm</Display>
-  <Edit>DocumentLibraryForm</Edit>
-  <New>DocumentLibraryForm</New>
-</FormTemplates>
-</file>
-
-<file path=customXml/item2.xml><?xml version="1.0" encoding="utf-8"?>
 <ct:contentTypeSchema xmlns:ct="http://schemas.microsoft.com/office/2006/metadata/contentType" xmlns:ma="http://schemas.microsoft.com/office/2006/metadata/properties/metaAttributes" ct:_="" ma:_="" ma:contentTypeName="Document" ma:contentTypeID="0x010100BB793235904ECB429D95AFCF930B613A" ma:contentTypeVersion="5" ma:contentTypeDescription="Create a new document." ma:contentTypeScope="" ma:versionID="4c390286563cacde125c37b699801796">
   <xsd:schema xmlns:xsd="http://www.w3.org/2001/XMLSchema" xmlns:xs="http://www.w3.org/2001/XMLSchema" xmlns:p="http://schemas.microsoft.com/office/2006/metadata/properties" xmlns:ns3="5032e021-b0cf-43e6-828a-5b682824f23c" xmlns:ns4="ef284efa-1316-4307-b1a8-b157427e4237" targetNamespace="http://schemas.microsoft.com/office/2006/metadata/properties" ma:root="true" ma:fieldsID="8c9c49ab243af388e89cdf0ba7aaaf48" ns3:_="" ns4:_="">
     <xsd:import namespace="5032e021-b0cf-43e6-828a-5b682824f23c"/>
@@ -32179,21 +32322,22 @@
 </ct:contentTypeSchema>
 </file>
 
-<file path=customXml/item3.xml><?xml version="1.0" encoding="utf-8"?>
+<file path=customXml/item2.xml><?xml version="1.0" encoding="utf-8"?>
 <p:properties xmlns:p="http://schemas.microsoft.com/office/2006/metadata/properties" xmlns:xsi="http://www.w3.org/2001/XMLSchema-instance" xmlns:pc="http://schemas.microsoft.com/office/infopath/2007/PartnerControls">
   <documentManagement/>
 </p:properties>
 </file>
 
-<file path=customXml/itemProps1.xml><?xml version="1.0" encoding="utf-8"?>
-<ds:datastoreItem xmlns:ds="http://schemas.openxmlformats.org/officeDocument/2006/customXml" ds:itemID="{0EFE0A5C-9604-4B3E-8F9E-98072B6B9F48}">
-  <ds:schemaRefs>
-    <ds:schemaRef ds:uri="http://schemas.microsoft.com/sharepoint/v3/contenttype/forms"/>
-  </ds:schemaRefs>
-</ds:datastoreItem>
+<file path=customXml/item3.xml><?xml version="1.0" encoding="utf-8"?>
+<?mso-contentType ?>
+<FormTemplates xmlns="http://schemas.microsoft.com/sharepoint/v3/contenttype/forms">
+  <Display>DocumentLibraryForm</Display>
+  <Edit>DocumentLibraryForm</Edit>
+  <New>DocumentLibraryForm</New>
+</FormTemplates>
 </file>
 
-<file path=customXml/itemProps2.xml><?xml version="1.0" encoding="utf-8"?>
+<file path=customXml/itemProps1.xml><?xml version="1.0" encoding="utf-8"?>
 <ds:datastoreItem xmlns:ds="http://schemas.openxmlformats.org/officeDocument/2006/customXml" ds:itemID="{E27FB234-31BD-4786-8167-C9B3AC2407FA}">
   <ds:schemaRefs>
     <ds:schemaRef ds:uri="http://schemas.microsoft.com/office/2006/metadata/contentType"/>
@@ -32212,7 +32356,7 @@
 </ds:datastoreItem>
 </file>
 
-<file path=customXml/itemProps3.xml><?xml version="1.0" encoding="utf-8"?>
+<file path=customXml/itemProps2.xml><?xml version="1.0" encoding="utf-8"?>
 <ds:datastoreItem xmlns:ds="http://schemas.openxmlformats.org/officeDocument/2006/customXml" ds:itemID="{12473D4E-B70B-4136-B747-E79AAA180FB8}">
   <ds:schemaRefs>
     <ds:schemaRef ds:uri="http://schemas.microsoft.com/office/2006/documentManagement/types"/>
@@ -32227,4 +32371,12 @@
     <ds:schemaRef ds:uri="http://purl.org/dc/dcmitype/"/>
   </ds:schemaRefs>
 </ds:datastoreItem>
+</file>
+
+<file path=customXml/itemProps3.xml><?xml version="1.0" encoding="utf-8"?>
+<ds:datastoreItem xmlns:ds="http://schemas.openxmlformats.org/officeDocument/2006/customXml" ds:itemID="{0EFE0A5C-9604-4B3E-8F9E-98072B6B9F48}">
+  <ds:schemaRefs>
+    <ds:schemaRef ds:uri="http://schemas.microsoft.com/sharepoint/v3/contenttype/forms"/>
+  </ds:schemaRefs>
+</ds:datastoreItem>
 </file>
</xml_diff>

<commit_message>
Adding inProgress for the solution
</commit_message>
<xml_diff>
--- a/lectures/day_1/WEP24_Day1_Basics.pptx
+++ b/lectures/day_1/WEP24_Day1_Basics.pptx
@@ -3336,7 +3336,7 @@
           <a:p>
             <a:fld id="{8F6C72E7-1AC8-4769-8510-C8FBA4EE0D31}" type="datetimeFigureOut">
               <a:rPr lang="nl-NL" smtClean="0"/>
-              <a:t>15-12-2023</a:t>
+              <a:t>21-12-2023</a:t>
             </a:fld>
             <a:endParaRPr lang="nl-NL"/>
           </a:p>
@@ -3729,14 +3729,7 @@
                 <a:latin typeface="Gill Sans Ultra Bold" panose="020B0A02020104020203" pitchFamily="34" charset="77"/>
                 <a:cs typeface="Phosphate Inline" panose="02000506050000020004" pitchFamily="2" charset="77"/>
               </a:rPr>
-              <a:t>Digital </a:t>
-            </a:r>
-            <a:r>
-              <a:rPr lang="en-US" sz="4800" dirty="0">
-                <a:latin typeface="Gill Sans Ultra Bold" panose="020B0A02020104020203" pitchFamily="34" charset="77"/>
-                <a:cs typeface="Phosphate Inline" panose="02000506050000020004" pitchFamily="2" charset="77"/>
-              </a:rPr>
-              <a:t>Adventure </a:t>
+              <a:t>Digital Adventure </a:t>
             </a:r>
           </a:p>
           <a:p>
@@ -4599,9 +4592,9 @@
           <a:lstStyle/>
           <a:p>
             <a:r>
-              <a:rPr lang="en-SA" sz="8800" b="1" dirty="0">
-                <a:solidFill>
-                  <a:srgbClr val="FE04AC"/>
+              <a:rPr lang="en-SA" sz="8800" b="1" baseline="0" dirty="0">
+                <a:solidFill>
+                  <a:srgbClr val="C00000"/>
                 </a:solidFill>
                 <a:latin typeface="Arial" panose="020B0604020202020204" pitchFamily="34" charset="0"/>
                 <a:cs typeface="Arial" panose="020B0604020202020204" pitchFamily="34" charset="0"/>
@@ -32152,6 +32145,21 @@
 </file>
 
 <file path=customXml/item1.xml><?xml version="1.0" encoding="utf-8"?>
+<p:properties xmlns:p="http://schemas.microsoft.com/office/2006/metadata/properties" xmlns:xsi="http://www.w3.org/2001/XMLSchema-instance" xmlns:pc="http://schemas.microsoft.com/office/infopath/2007/PartnerControls">
+  <documentManagement/>
+</p:properties>
+</file>
+
+<file path=customXml/item2.xml><?xml version="1.0" encoding="utf-8"?>
+<?mso-contentType ?>
+<FormTemplates xmlns="http://schemas.microsoft.com/sharepoint/v3/contenttype/forms">
+  <Display>DocumentLibraryForm</Display>
+  <Edit>DocumentLibraryForm</Edit>
+  <New>DocumentLibraryForm</New>
+</FormTemplates>
+</file>
+
+<file path=customXml/item3.xml><?xml version="1.0" encoding="utf-8"?>
 <ct:contentTypeSchema xmlns:ct="http://schemas.microsoft.com/office/2006/metadata/contentType" xmlns:ma="http://schemas.microsoft.com/office/2006/metadata/properties/metaAttributes" ct:_="" ma:_="" ma:contentTypeName="Document" ma:contentTypeID="0x010100BB793235904ECB429D95AFCF930B613A" ma:contentTypeVersion="5" ma:contentTypeDescription="Create a new document." ma:contentTypeScope="" ma:versionID="4c390286563cacde125c37b699801796">
   <xsd:schema xmlns:xsd="http://www.w3.org/2001/XMLSchema" xmlns:xs="http://www.w3.org/2001/XMLSchema" xmlns:p="http://schemas.microsoft.com/office/2006/metadata/properties" xmlns:ns3="5032e021-b0cf-43e6-828a-5b682824f23c" xmlns:ns4="ef284efa-1316-4307-b1a8-b157427e4237" targetNamespace="http://schemas.microsoft.com/office/2006/metadata/properties" ma:root="true" ma:fieldsID="8c9c49ab243af388e89cdf0ba7aaaf48" ns3:_="" ns4:_="">
     <xsd:import namespace="5032e021-b0cf-43e6-828a-5b682824f23c"/>
@@ -32322,22 +32330,32 @@
 </ct:contentTypeSchema>
 </file>
 
-<file path=customXml/item2.xml><?xml version="1.0" encoding="utf-8"?>
-<p:properties xmlns:p="http://schemas.microsoft.com/office/2006/metadata/properties" xmlns:xsi="http://www.w3.org/2001/XMLSchema-instance" xmlns:pc="http://schemas.microsoft.com/office/infopath/2007/PartnerControls">
-  <documentManagement/>
-</p:properties>
+<file path=customXml/itemProps1.xml><?xml version="1.0" encoding="utf-8"?>
+<ds:datastoreItem xmlns:ds="http://schemas.openxmlformats.org/officeDocument/2006/customXml" ds:itemID="{12473D4E-B70B-4136-B747-E79AAA180FB8}">
+  <ds:schemaRefs>
+    <ds:schemaRef ds:uri="http://schemas.microsoft.com/office/2006/documentManagement/types"/>
+    <ds:schemaRef ds:uri="http://schemas.microsoft.com/office/infopath/2007/PartnerControls"/>
+    <ds:schemaRef ds:uri="5032e021-b0cf-43e6-828a-5b682824f23c"/>
+    <ds:schemaRef ds:uri="http://purl.org/dc/elements/1.1/"/>
+    <ds:schemaRef ds:uri="http://schemas.microsoft.com/office/2006/metadata/properties"/>
+    <ds:schemaRef ds:uri="http://purl.org/dc/terms/"/>
+    <ds:schemaRef ds:uri="ef284efa-1316-4307-b1a8-b157427e4237"/>
+    <ds:schemaRef ds:uri="http://schemas.openxmlformats.org/package/2006/metadata/core-properties"/>
+    <ds:schemaRef ds:uri="http://www.w3.org/XML/1998/namespace"/>
+    <ds:schemaRef ds:uri="http://purl.org/dc/dcmitype/"/>
+  </ds:schemaRefs>
+</ds:datastoreItem>
 </file>
 
-<file path=customXml/item3.xml><?xml version="1.0" encoding="utf-8"?>
-<?mso-contentType ?>
-<FormTemplates xmlns="http://schemas.microsoft.com/sharepoint/v3/contenttype/forms">
-  <Display>DocumentLibraryForm</Display>
-  <Edit>DocumentLibraryForm</Edit>
-  <New>DocumentLibraryForm</New>
-</FormTemplates>
+<file path=customXml/itemProps2.xml><?xml version="1.0" encoding="utf-8"?>
+<ds:datastoreItem xmlns:ds="http://schemas.openxmlformats.org/officeDocument/2006/customXml" ds:itemID="{0EFE0A5C-9604-4B3E-8F9E-98072B6B9F48}">
+  <ds:schemaRefs>
+    <ds:schemaRef ds:uri="http://schemas.microsoft.com/sharepoint/v3/contenttype/forms"/>
+  </ds:schemaRefs>
+</ds:datastoreItem>
 </file>
 
-<file path=customXml/itemProps1.xml><?xml version="1.0" encoding="utf-8"?>
+<file path=customXml/itemProps3.xml><?xml version="1.0" encoding="utf-8"?>
 <ds:datastoreItem xmlns:ds="http://schemas.openxmlformats.org/officeDocument/2006/customXml" ds:itemID="{E27FB234-31BD-4786-8167-C9B3AC2407FA}">
   <ds:schemaRefs>
     <ds:schemaRef ds:uri="http://schemas.microsoft.com/office/2006/metadata/contentType"/>
@@ -32354,29 +32372,4 @@
     <ds:schemaRef ds:uri="http://schemas.microsoft.com/internal/obd"/>
   </ds:schemaRefs>
 </ds:datastoreItem>
-</file>
-
-<file path=customXml/itemProps2.xml><?xml version="1.0" encoding="utf-8"?>
-<ds:datastoreItem xmlns:ds="http://schemas.openxmlformats.org/officeDocument/2006/customXml" ds:itemID="{12473D4E-B70B-4136-B747-E79AAA180FB8}">
-  <ds:schemaRefs>
-    <ds:schemaRef ds:uri="http://schemas.microsoft.com/office/2006/documentManagement/types"/>
-    <ds:schemaRef ds:uri="http://schemas.microsoft.com/office/infopath/2007/PartnerControls"/>
-    <ds:schemaRef ds:uri="5032e021-b0cf-43e6-828a-5b682824f23c"/>
-    <ds:schemaRef ds:uri="http://purl.org/dc/elements/1.1/"/>
-    <ds:schemaRef ds:uri="http://schemas.microsoft.com/office/2006/metadata/properties"/>
-    <ds:schemaRef ds:uri="http://purl.org/dc/terms/"/>
-    <ds:schemaRef ds:uri="ef284efa-1316-4307-b1a8-b157427e4237"/>
-    <ds:schemaRef ds:uri="http://schemas.openxmlformats.org/package/2006/metadata/core-properties"/>
-    <ds:schemaRef ds:uri="http://www.w3.org/XML/1998/namespace"/>
-    <ds:schemaRef ds:uri="http://purl.org/dc/dcmitype/"/>
-  </ds:schemaRefs>
-</ds:datastoreItem>
-</file>
-
-<file path=customXml/itemProps3.xml><?xml version="1.0" encoding="utf-8"?>
-<ds:datastoreItem xmlns:ds="http://schemas.openxmlformats.org/officeDocument/2006/customXml" ds:itemID="{0EFE0A5C-9604-4B3E-8F9E-98072B6B9F48}">
-  <ds:schemaRefs>
-    <ds:schemaRef ds:uri="http://schemas.microsoft.com/sharepoint/v3/contenttype/forms"/>
-  </ds:schemaRefs>
-</ds:datastoreItem>
 </file>
</xml_diff>